<commit_message>
addded pdf of the presentation .. missing sketches
</commit_message>
<xml_diff>
--- a/IPhonePresentation.pptx
+++ b/IPhonePresentation.pptx
@@ -302,7 +302,7 @@
           <a:p>
             <a:fld id="{216C5678-EE20-4FA5-88E2-6E0BD67A2E26}" type="datetime1">
               <a:rPr lang="en-US" smtClean="0"/>
-              <a:t>11/23/13</a:t>
+              <a:t>11/24/13</a:t>
             </a:fld>
             <a:endParaRPr lang="en-US" dirty="0"/>
           </a:p>
@@ -472,7 +472,7 @@
           <a:p>
             <a:fld id="{EA051B39-B140-43FE-96DB-472A2B59CE7C}" type="datetime1">
               <a:rPr lang="en-US" smtClean="0"/>
-              <a:t>11/23/13</a:t>
+              <a:t>11/24/13</a:t>
             </a:fld>
             <a:endParaRPr lang="en-US"/>
           </a:p>
@@ -652,7 +652,7 @@
           <a:p>
             <a:fld id="{DA600BB2-27C5-458B-ABCE-839C88CF47CE}" type="datetime1">
               <a:rPr lang="en-US" smtClean="0"/>
-              <a:t>11/23/13</a:t>
+              <a:t>11/24/13</a:t>
             </a:fld>
             <a:endParaRPr lang="en-US"/>
           </a:p>
@@ -840,7 +840,7 @@
           <a:p>
             <a:fld id="{B11D738E-8962-435F-8C43-147B8DD7E819}" type="datetime1">
               <a:rPr lang="en-US" smtClean="0"/>
-              <a:t>11/23/13</a:t>
+              <a:t>11/24/13</a:t>
             </a:fld>
             <a:endParaRPr lang="en-US"/>
           </a:p>
@@ -1107,7 +1107,7 @@
           <a:p>
             <a:fld id="{09CAEA93-55E7-4DA9-90C2-089A26EEFEC4}" type="datetime1">
               <a:rPr lang="en-US" smtClean="0"/>
-              <a:t>11/23/13</a:t>
+              <a:t>11/24/13</a:t>
             </a:fld>
             <a:endParaRPr lang="en-US"/>
           </a:p>
@@ -1460,7 +1460,7 @@
           <a:p>
             <a:fld id="{E34CF3C7-6809-4F39-BD67-A75817BDDE0A}" type="datetime1">
               <a:rPr lang="en-US" smtClean="0"/>
-              <a:t>11/23/13</a:t>
+              <a:t>11/24/13</a:t>
             </a:fld>
             <a:endParaRPr lang="en-US"/>
           </a:p>
@@ -1773,7 +1773,7 @@
           <a:p>
             <a:fld id="{F7EAEB24-CE78-465C-A726-91D0868FA48F}" type="datetime1">
               <a:rPr lang="en-US" smtClean="0"/>
-              <a:t>11/23/13</a:t>
+              <a:t>11/24/13</a:t>
             </a:fld>
             <a:endParaRPr lang="en-US"/>
           </a:p>
@@ -2005,7 +2005,7 @@
           <a:p>
             <a:fld id="{40BAADF0-1749-4E8B-9691-B44A5F8C0895}" type="datetime1">
               <a:rPr lang="en-US" smtClean="0"/>
-              <a:t>11/23/13</a:t>
+              <a:t>11/24/13</a:t>
             </a:fld>
             <a:endParaRPr lang="en-US"/>
           </a:p>
@@ -2100,7 +2100,7 @@
           <a:p>
             <a:fld id="{A8AF628A-A867-4937-BBE5-207DB6F9C51A}" type="datetime1">
               <a:rPr lang="en-US" smtClean="0"/>
-              <a:t>11/23/13</a:t>
+              <a:t>11/24/13</a:t>
             </a:fld>
             <a:endParaRPr lang="en-US"/>
           </a:p>
@@ -2393,7 +2393,7 @@
           <a:p>
             <a:fld id="{118BBB94-68E6-4675-A946-F1C5994EDBD7}" type="datetime1">
               <a:rPr lang="en-US" smtClean="0"/>
-              <a:t>11/23/13</a:t>
+              <a:t>11/24/13</a:t>
             </a:fld>
             <a:endParaRPr lang="en-US"/>
           </a:p>
@@ -2667,7 +2667,7 @@
           <a:p>
             <a:fld id="{DC3B8377-21E3-4835-B75D-4E2847E2750F}" type="datetime1">
               <a:rPr lang="en-US" smtClean="0"/>
-              <a:t>11/23/13</a:t>
+              <a:t>11/24/13</a:t>
             </a:fld>
             <a:endParaRPr lang="en-US"/>
           </a:p>
@@ -2882,7 +2882,7 @@
           <a:p>
             <a:fld id="{B0C4986D-6BE9-4264-908F-02DB36FD8D6C}" type="datetime1">
               <a:rPr lang="en-US" smtClean="0"/>
-              <a:t>11/23/13</a:t>
+              <a:t>11/24/13</a:t>
             </a:fld>
             <a:endParaRPr lang="en-US" dirty="0"/>
           </a:p>
@@ -3423,7 +3423,7 @@
           <a:p>
             <a:r>
               <a:rPr lang="en-US" dirty="0" smtClean="0"/>
-              <a:t>Space Invaders IOS :) </a:t>
+              <a:t>Space Invaders </a:t>
             </a:r>
             <a:endParaRPr lang="en-US" dirty="0"/>
           </a:p>

</xml_diff>